<commit_message>
I have change proposal
</commit_message>
<xml_diff>
--- a/Opp Project.pptx
+++ b/Opp Project.pptx
@@ -128,6 +128,7 @@
 <file path=ppt/revisionInfo.xml><?xml version="1.0" encoding="utf-8"?>
 <p1510:revInfo xmlns:a="http://schemas.openxmlformats.org/drawingml/2006/main" xmlns:r="http://schemas.openxmlformats.org/officeDocument/2006/relationships" xmlns:p1510="http://schemas.microsoft.com/office/powerpoint/2015/10/main">
   <p1510:revLst>
+    <p1510:client id="{4140247D-C769-4997-90EB-A22CA4D82AD7}" v="6" dt="2023-02-28T18:39:31.605"/>
     <p1510:client id="{CABF2434-9392-4C18-83A9-48C4A356C7EA}" v="18" dt="2023-02-27T18:49:56.451"/>
   </p1510:revLst>
 </p1510:revInfo>
@@ -277,10 +278,25 @@
   <pc:docChgLst>
     <pc:chgData name="Kifayat Ur Rahman" userId="6189d9e9ba0e3bb0" providerId="LiveId" clId="{4140247D-C769-4997-90EB-A22CA4D82AD7}"/>
     <pc:docChg chg="custSel modSld">
-      <pc:chgData name="Kifayat Ur Rahman" userId="6189d9e9ba0e3bb0" providerId="LiveId" clId="{4140247D-C769-4997-90EB-A22CA4D82AD7}" dt="2023-02-28T17:32:39.597" v="2" actId="20577"/>
+      <pc:chgData name="Kifayat Ur Rahman" userId="6189d9e9ba0e3bb0" providerId="LiveId" clId="{4140247D-C769-4997-90EB-A22CA4D82AD7}" dt="2023-02-28T18:39:31.605" v="8" actId="20577"/>
       <pc:docMkLst>
         <pc:docMk/>
       </pc:docMkLst>
+      <pc:sldChg chg="modSp">
+        <pc:chgData name="Kifayat Ur Rahman" userId="6189d9e9ba0e3bb0" providerId="LiveId" clId="{4140247D-C769-4997-90EB-A22CA4D82AD7}" dt="2023-02-28T18:39:31.605" v="8" actId="20577"/>
+        <pc:sldMkLst>
+          <pc:docMk/>
+          <pc:sldMk cId="4262556272" sldId="256"/>
+        </pc:sldMkLst>
+        <pc:spChg chg="mod">
+          <ac:chgData name="Kifayat Ur Rahman" userId="6189d9e9ba0e3bb0" providerId="LiveId" clId="{4140247D-C769-4997-90EB-A22CA4D82AD7}" dt="2023-02-28T18:39:31.605" v="8" actId="20577"/>
+          <ac:spMkLst>
+            <pc:docMk/>
+            <pc:sldMk cId="4262556272" sldId="256"/>
+            <ac:spMk id="3" creationId="{E3658704-6064-192E-EFF7-C7702951463A}"/>
+          </ac:spMkLst>
+        </pc:spChg>
+      </pc:sldChg>
       <pc:sldChg chg="modSp mod">
         <pc:chgData name="Kifayat Ur Rahman" userId="6189d9e9ba0e3bb0" providerId="LiveId" clId="{4140247D-C769-4997-90EB-A22CA4D82AD7}" dt="2023-02-28T17:27:54.876" v="0" actId="33524"/>
         <pc:sldMkLst>
@@ -6426,7 +6442,19 @@
           <a:p>
             <a:r>
               <a:rPr lang="en-US" dirty="0"/>
-              <a:t>Sir usama bin Shakeel  </a:t>
+              <a:t>Sir usama </a:t>
+            </a:r>
+            <a:r>
+              <a:rPr lang="en-US"/>
+              <a:t>bin Shakeel (</a:t>
+            </a:r>
+            <a:r>
+              <a:rPr lang="en-US" dirty="0" err="1"/>
+              <a:t>ubs</a:t>
+            </a:r>
+            <a:r>
+              <a:rPr lang="en-US" dirty="0"/>
+              <a:t>)  </a:t>
             </a:r>
           </a:p>
         </p:txBody>

</xml_diff>